<commit_message>
Update Howto - Windows Subsystem for Linux.pptx
</commit_message>
<xml_diff>
--- a/Howto - Windows Subsystem for Linux.pptx
+++ b/Howto - Windows Subsystem for Linux.pptx
@@ -29,8 +29,10 @@
     <p:sldId id="282" r:id="rId23"/>
     <p:sldId id="280" r:id="rId24"/>
     <p:sldId id="281" r:id="rId25"/>
-    <p:sldId id="271" r:id="rId26"/>
-    <p:sldId id="272" r:id="rId27"/>
+    <p:sldId id="283" r:id="rId26"/>
+    <p:sldId id="284" r:id="rId27"/>
+    <p:sldId id="271" r:id="rId28"/>
+    <p:sldId id="272" r:id="rId29"/>
   </p:sldIdLst>
   <p:sldSz cx="12192000" cy="6858000"/>
   <p:notesSz cx="6858000" cy="9144000"/>
@@ -268,7 +270,7 @@
           <a:p>
             <a:fld id="{BCF60079-DA6F-4033-857A-8B1F0437C284}" type="datetimeFigureOut">
               <a:rPr lang="en-IN" smtClean="0"/>
-              <a:t>08-05-2020</a:t>
+              <a:t>13-06-2020</a:t>
             </a:fld>
             <a:endParaRPr lang="en-IN" dirty="0"/>
           </a:p>
@@ -438,7 +440,7 @@
           <a:p>
             <a:fld id="{BCF60079-DA6F-4033-857A-8B1F0437C284}" type="datetimeFigureOut">
               <a:rPr lang="en-IN" smtClean="0"/>
-              <a:t>08-05-2020</a:t>
+              <a:t>13-06-2020</a:t>
             </a:fld>
             <a:endParaRPr lang="en-IN" dirty="0"/>
           </a:p>
@@ -618,7 +620,7 @@
           <a:p>
             <a:fld id="{BCF60079-DA6F-4033-857A-8B1F0437C284}" type="datetimeFigureOut">
               <a:rPr lang="en-IN" smtClean="0"/>
-              <a:t>08-05-2020</a:t>
+              <a:t>13-06-2020</a:t>
             </a:fld>
             <a:endParaRPr lang="en-IN" dirty="0"/>
           </a:p>
@@ -788,7 +790,7 @@
           <a:p>
             <a:fld id="{BCF60079-DA6F-4033-857A-8B1F0437C284}" type="datetimeFigureOut">
               <a:rPr lang="en-IN" smtClean="0"/>
-              <a:t>08-05-2020</a:t>
+              <a:t>13-06-2020</a:t>
             </a:fld>
             <a:endParaRPr lang="en-IN" dirty="0"/>
           </a:p>
@@ -1034,7 +1036,7 @@
           <a:p>
             <a:fld id="{BCF60079-DA6F-4033-857A-8B1F0437C284}" type="datetimeFigureOut">
               <a:rPr lang="en-IN" smtClean="0"/>
-              <a:t>08-05-2020</a:t>
+              <a:t>13-06-2020</a:t>
             </a:fld>
             <a:endParaRPr lang="en-IN" dirty="0"/>
           </a:p>
@@ -1266,7 +1268,7 @@
           <a:p>
             <a:fld id="{BCF60079-DA6F-4033-857A-8B1F0437C284}" type="datetimeFigureOut">
               <a:rPr lang="en-IN" smtClean="0"/>
-              <a:t>08-05-2020</a:t>
+              <a:t>13-06-2020</a:t>
             </a:fld>
             <a:endParaRPr lang="en-IN" dirty="0"/>
           </a:p>
@@ -1633,7 +1635,7 @@
           <a:p>
             <a:fld id="{BCF60079-DA6F-4033-857A-8B1F0437C284}" type="datetimeFigureOut">
               <a:rPr lang="en-IN" smtClean="0"/>
-              <a:t>08-05-2020</a:t>
+              <a:t>13-06-2020</a:t>
             </a:fld>
             <a:endParaRPr lang="en-IN" dirty="0"/>
           </a:p>
@@ -1751,7 +1753,7 @@
           <a:p>
             <a:fld id="{BCF60079-DA6F-4033-857A-8B1F0437C284}" type="datetimeFigureOut">
               <a:rPr lang="en-IN" smtClean="0"/>
-              <a:t>08-05-2020</a:t>
+              <a:t>13-06-2020</a:t>
             </a:fld>
             <a:endParaRPr lang="en-IN" dirty="0"/>
           </a:p>
@@ -1846,7 +1848,7 @@
           <a:p>
             <a:fld id="{BCF60079-DA6F-4033-857A-8B1F0437C284}" type="datetimeFigureOut">
               <a:rPr lang="en-IN" smtClean="0"/>
-              <a:t>08-05-2020</a:t>
+              <a:t>13-06-2020</a:t>
             </a:fld>
             <a:endParaRPr lang="en-IN" dirty="0"/>
           </a:p>
@@ -2123,7 +2125,7 @@
           <a:p>
             <a:fld id="{BCF60079-DA6F-4033-857A-8B1F0437C284}" type="datetimeFigureOut">
               <a:rPr lang="en-IN" smtClean="0"/>
-              <a:t>08-05-2020</a:t>
+              <a:t>13-06-2020</a:t>
             </a:fld>
             <a:endParaRPr lang="en-IN" dirty="0"/>
           </a:p>
@@ -2376,7 +2378,7 @@
           <a:p>
             <a:fld id="{BCF60079-DA6F-4033-857A-8B1F0437C284}" type="datetimeFigureOut">
               <a:rPr lang="en-IN" smtClean="0"/>
-              <a:t>08-05-2020</a:t>
+              <a:t>13-06-2020</a:t>
             </a:fld>
             <a:endParaRPr lang="en-IN" dirty="0"/>
           </a:p>
@@ -2589,7 +2591,7 @@
           <a:p>
             <a:fld id="{BCF60079-DA6F-4033-857A-8B1F0437C284}" type="datetimeFigureOut">
               <a:rPr lang="en-IN" smtClean="0"/>
-              <a:t>08-05-2020</a:t>
+              <a:t>13-06-2020</a:t>
             </a:fld>
             <a:endParaRPr lang="en-IN" dirty="0"/>
           </a:p>
@@ -3019,11 +3021,7 @@
             <a:pPr algn="l"/>
             <a:r>
               <a:rPr lang="en-IN" sz="4800" dirty="0" smtClean="0"/>
-              <a:t>Howto – Windows 10 Subsystem for </a:t>
-            </a:r>
-            <a:r>
-              <a:rPr lang="en-IN" sz="4800" dirty="0" smtClean="0"/>
-              <a:t>Linux</a:t>
+              <a:t>Howto – Windows 10 Subsystem for Linux</a:t>
             </a:r>
             <a:br>
               <a:rPr lang="en-IN" sz="4800" dirty="0" smtClean="0"/>
@@ -6073,12 +6071,12 @@
                     <a:p>
                       <a:pPr algn="l" fontAlgn="b"/>
                       <a:r>
-                        <a:rPr lang="en-IN" sz="1000" u="none" strike="noStrike">
+                        <a:rPr lang="en-IN" sz="1000" u="none" strike="noStrike" dirty="0">
                           <a:effectLst/>
                         </a:rPr>
                         <a:t>Get general information of a distribution.</a:t>
                       </a:r>
-                      <a:endParaRPr lang="en-IN" sz="1000" b="0" i="0" u="none" strike="noStrike">
+                      <a:endParaRPr lang="en-IN" sz="1000" b="0" i="0" u="none" strike="noStrike" dirty="0">
                         <a:solidFill>
                           <a:srgbClr val="000000"/>
                         </a:solidFill>
@@ -6348,7 +6346,7 @@
         <p:spPr/>
         <p:txBody>
           <a:bodyPr>
-            <a:normAutofit fontScale="47500" lnSpcReduction="20000"/>
+            <a:normAutofit fontScale="55000" lnSpcReduction="20000"/>
           </a:bodyPr>
           <a:lstStyle/>
           <a:p>
@@ -6389,44 +6387,54 @@
               <a:buNone/>
             </a:pPr>
             <a:r>
+              <a:rPr lang="pl-PL" dirty="0" smtClean="0"/>
+              <a:t>Debian</a:t>
+            </a:r>
+            <a:r>
               <a:rPr lang="pl-PL" dirty="0"/>
-              <a:t>Ubuntu 18.04: https://aka.ms/wsl-ubuntu-1804</a:t>
-            </a:r>
-          </a:p>
-          <a:p>
-            <a:pPr marL="0" indent="0">
-              <a:buNone/>
-            </a:pPr>
+              <a:t>: https://aka.ms/wsl-debian-gnulinux</a:t>
+            </a:r>
+          </a:p>
+          <a:p>
+            <a:pPr marL="0" indent="0">
+              <a:buNone/>
+            </a:pPr>
+            <a:r>
+              <a:rPr lang="fr-FR" dirty="0"/>
+              <a:t>OpenSUSE Leap </a:t>
+            </a:r>
+            <a:r>
+              <a:rPr lang="fr-FR" dirty="0" smtClean="0"/>
+              <a:t>42: https</a:t>
+            </a:r>
+            <a:r>
+              <a:rPr lang="fr-FR" dirty="0"/>
+              <a:t>://aka.ms/wsl-opensuse-42</a:t>
+            </a:r>
+          </a:p>
+          <a:p>
+            <a:pPr marL="0" indent="0">
+              <a:buNone/>
+            </a:pPr>
+            <a:r>
+              <a:rPr lang="fr-FR" dirty="0"/>
+              <a:t>SUSE Linux Enterprise Server </a:t>
+            </a:r>
+            <a:r>
+              <a:rPr lang="fr-FR" dirty="0" smtClean="0"/>
+              <a:t>12: https</a:t>
+            </a:r>
+            <a:r>
+              <a:rPr lang="fr-FR" dirty="0"/>
+              <a:t>://aka.ms/wsl-sles-12</a:t>
+            </a:r>
+            <a:r>
+              <a:rPr lang="pl-PL" dirty="0" smtClean="0"/>
+              <a:t>Kali</a:t>
+            </a:r>
             <a:r>
               <a:rPr lang="pl-PL" dirty="0"/>
-              <a:t>Debian: https://aka.ms/wsl-debian-gnulinux</a:t>
-            </a:r>
-          </a:p>
-          <a:p>
-            <a:pPr marL="0" indent="0">
-              <a:buNone/>
-            </a:pPr>
-            <a:r>
-              <a:rPr lang="pl-PL" dirty="0"/>
-              <a:t>openSUSE: https://aka.ms/wsl-opensuse-42</a:t>
-            </a:r>
-          </a:p>
-          <a:p>
-            <a:pPr marL="0" indent="0">
-              <a:buNone/>
-            </a:pPr>
-            <a:r>
-              <a:rPr lang="pl-PL" dirty="0"/>
-              <a:t>SLES: https://aka.ms/wsl-sles-12</a:t>
-            </a:r>
-          </a:p>
-          <a:p>
-            <a:pPr marL="0" indent="0">
-              <a:buNone/>
-            </a:pPr>
-            <a:r>
-              <a:rPr lang="pl-PL" dirty="0"/>
-              <a:t>Kali: https://</a:t>
+              <a:t>: https://</a:t>
             </a:r>
             <a:r>
               <a:rPr lang="pl-PL" dirty="0" smtClean="0"/>
@@ -7654,7 +7662,7 @@
         <p:spPr/>
         <p:txBody>
           <a:bodyPr numCol="2">
-            <a:normAutofit fontScale="40000" lnSpcReduction="20000"/>
+            <a:normAutofit fontScale="32500" lnSpcReduction="20000"/>
           </a:bodyPr>
           <a:lstStyle/>
           <a:p>
@@ -7997,6 +8005,34 @@
           <a:p>
             <a:r>
               <a:rPr lang="en-US" sz="4700" dirty="0" smtClean="0"/>
+              <a:t>Develop .Net Core </a:t>
+            </a:r>
+            <a:r>
+              <a:rPr lang="en-US" sz="4800" dirty="0"/>
+              <a:t>Application </a:t>
+            </a:r>
+            <a:r>
+              <a:rPr lang="en-US" sz="4800" dirty="0" smtClean="0"/>
+              <a:t> on WSL</a:t>
+            </a:r>
+          </a:p>
+          <a:p>
+            <a:pPr lvl="1"/>
+            <a:r>
+              <a:rPr lang="en-US" sz="4300" dirty="0" smtClean="0"/>
+              <a:t>Install .Net Core SDK on WSL</a:t>
+            </a:r>
+          </a:p>
+          <a:p>
+            <a:pPr lvl="1"/>
+            <a:r>
+              <a:rPr lang="en-IN" sz="4300" dirty="0"/>
+              <a:t>Create HelloWorld Sample App</a:t>
+            </a:r>
+          </a:p>
+          <a:p>
+            <a:r>
+              <a:rPr lang="en-US" sz="4300" dirty="0"/>
               <a:t>References</a:t>
             </a:r>
           </a:p>
@@ -8552,9 +8588,10 @@
               <a:buNone/>
             </a:pPr>
             <a:r>
-              <a:rPr lang="en-US" dirty="0" smtClean="0"/>
+              <a:rPr lang="en-US" smtClean="0"/>
               <a:t>Port 2225</a:t>
             </a:r>
+            <a:endParaRPr lang="en-US" dirty="0" smtClean="0"/>
           </a:p>
           <a:p>
             <a:pPr marL="0" indent="0">
@@ -8978,8 +9015,12 @@
           <a:lstStyle/>
           <a:p>
             <a:r>
+              <a:rPr lang="en-US" dirty="0"/>
+              <a:t>Install .Net Core SDK on </a:t>
+            </a:r>
+            <a:r>
               <a:rPr lang="en-US" dirty="0" smtClean="0"/>
-              <a:t>References</a:t>
+              <a:t>WSL</a:t>
             </a:r>
             <a:endParaRPr lang="en-IN" dirty="0"/>
           </a:p>
@@ -8997,62 +9038,173 @@
         </p:nvSpPr>
         <p:spPr/>
         <p:txBody>
-          <a:bodyPr/>
+          <a:bodyPr>
+            <a:normAutofit fontScale="70000" lnSpcReduction="20000"/>
+          </a:bodyPr>
           <a:lstStyle/>
           <a:p>
-            <a:r>
-              <a:rPr lang="en-IN" dirty="0">
-                <a:hlinkClick r:id="rId2"/>
-              </a:rPr>
-              <a:t>https://docs.microsoft.com/en-us/archive/blogs/wsl/</a:t>
-            </a:r>
-          </a:p>
-          <a:p>
-            <a:r>
-              <a:rPr lang="en-IN" dirty="0" smtClean="0">
-                <a:hlinkClick r:id="rId2"/>
-              </a:rPr>
-              <a:t>https</a:t>
-            </a:r>
-            <a:r>
-              <a:rPr lang="en-IN" dirty="0">
-                <a:hlinkClick r:id="rId2"/>
-              </a:rPr>
-              <a:t>://</a:t>
-            </a:r>
-            <a:r>
-              <a:rPr lang="en-IN" dirty="0" smtClean="0">
-                <a:hlinkClick r:id="rId2"/>
-              </a:rPr>
-              <a:t>docs.microsoft.com/en-us/windows/wsl/about</a:t>
+            <a:pPr marL="0" indent="0">
+              <a:buNone/>
+            </a:pPr>
+            <a:r>
+              <a:rPr lang="en-IN" dirty="0" smtClean="0"/>
+              <a:t>1. Add </a:t>
+            </a:r>
+            <a:r>
+              <a:rPr lang="en-IN" dirty="0"/>
+              <a:t>Microsoft repository key and </a:t>
+            </a:r>
+            <a:r>
+              <a:rPr lang="en-IN" dirty="0" smtClean="0"/>
+              <a:t>feed</a:t>
+            </a:r>
+          </a:p>
+          <a:p>
+            <a:pPr marL="0" indent="0">
+              <a:buNone/>
+            </a:pPr>
+            <a:r>
+              <a:rPr lang="nn-NO" dirty="0" smtClean="0"/>
+              <a:t>$ wget </a:t>
+            </a:r>
+            <a:r>
+              <a:rPr lang="nn-NO" dirty="0"/>
+              <a:t>https://packages.microsoft.com/config/ubuntu/16.04/packages-microsoft-prod.deb -O packages-microsoft-prod.deb</a:t>
+            </a:r>
+          </a:p>
+          <a:p>
+            <a:pPr marL="0" indent="0">
+              <a:buNone/>
+            </a:pPr>
+            <a:r>
+              <a:rPr lang="nn-NO" dirty="0" smtClean="0"/>
+              <a:t>$ sudo </a:t>
+            </a:r>
+            <a:r>
+              <a:rPr lang="nn-NO" dirty="0"/>
+              <a:t>dpkg -i </a:t>
+            </a:r>
+            <a:r>
+              <a:rPr lang="nn-NO" dirty="0" smtClean="0"/>
+              <a:t>packages-microsoft-prod.deb</a:t>
+            </a:r>
+          </a:p>
+          <a:p>
+            <a:pPr marL="0" indent="0">
+              <a:buNone/>
+            </a:pPr>
+            <a:endParaRPr lang="nn-NO" dirty="0"/>
+          </a:p>
+          <a:p>
+            <a:pPr marL="0" indent="0">
+              <a:buNone/>
+            </a:pPr>
+            <a:r>
+              <a:rPr lang="nn-NO" dirty="0" smtClean="0"/>
+              <a:t>2. </a:t>
+            </a:r>
+            <a:r>
+              <a:rPr lang="en-IN" dirty="0"/>
+              <a:t>Install the .NET Core </a:t>
+            </a:r>
+            <a:r>
+              <a:rPr lang="en-IN" dirty="0" smtClean="0"/>
+              <a:t>SDK</a:t>
+            </a:r>
+          </a:p>
+          <a:p>
+            <a:pPr marL="0" indent="0">
+              <a:buNone/>
+            </a:pPr>
+            <a:r>
+              <a:rPr lang="en-IN" dirty="0" smtClean="0"/>
+              <a:t>$ sudo </a:t>
+            </a:r>
+            <a:r>
+              <a:rPr lang="en-IN" dirty="0"/>
+              <a:t>apt-get update</a:t>
+            </a:r>
+          </a:p>
+          <a:p>
+            <a:pPr marL="0" indent="0">
+              <a:buNone/>
+            </a:pPr>
+            <a:r>
+              <a:rPr lang="en-IN" dirty="0" smtClean="0"/>
+              <a:t>$ sudo </a:t>
+            </a:r>
+            <a:r>
+              <a:rPr lang="en-IN" dirty="0"/>
+              <a:t>apt-get install apt-transport-https</a:t>
+            </a:r>
+          </a:p>
+          <a:p>
+            <a:pPr marL="0" indent="0">
+              <a:buNone/>
+            </a:pPr>
+            <a:r>
+              <a:rPr lang="en-IN" dirty="0" smtClean="0"/>
+              <a:t>$ sudo </a:t>
+            </a:r>
+            <a:r>
+              <a:rPr lang="en-IN" dirty="0"/>
+              <a:t>apt-get update</a:t>
+            </a:r>
+          </a:p>
+          <a:p>
+            <a:pPr marL="0" indent="0">
+              <a:buNone/>
+            </a:pPr>
+            <a:r>
+              <a:rPr lang="en-IN" dirty="0" smtClean="0"/>
+              <a:t>$ sudo </a:t>
+            </a:r>
+            <a:r>
+              <a:rPr lang="en-IN" dirty="0"/>
+              <a:t>apt-get install </a:t>
+            </a:r>
+            <a:r>
+              <a:rPr lang="en-IN" dirty="0" smtClean="0"/>
+              <a:t>dotnet-sdk-2.1</a:t>
+            </a:r>
+          </a:p>
+          <a:p>
+            <a:pPr marL="0" indent="0">
+              <a:buNone/>
+            </a:pPr>
+            <a:endParaRPr lang="en-US" dirty="0"/>
+          </a:p>
+          <a:p>
+            <a:pPr marL="0" indent="0">
+              <a:buNone/>
+            </a:pPr>
+            <a:r>
+              <a:rPr lang="en-US" dirty="0" smtClean="0"/>
+              <a:t>3. </a:t>
+            </a:r>
+            <a:r>
+              <a:rPr lang="en-IN" dirty="0"/>
+              <a:t>Validate </a:t>
+            </a:r>
+            <a:r>
+              <a:rPr lang="en-IN" dirty="0" smtClean="0"/>
+              <a:t>dotnet core installation</a:t>
+            </a:r>
+          </a:p>
+          <a:p>
+            <a:pPr marL="0" indent="0">
+              <a:buNone/>
+            </a:pPr>
+            <a:r>
+              <a:rPr lang="en-US" dirty="0" smtClean="0"/>
+              <a:t>$ dotnet --version</a:t>
             </a:r>
             <a:endParaRPr lang="en-IN" dirty="0" smtClean="0"/>
           </a:p>
           <a:p>
-            <a:r>
-              <a:rPr lang="en-IN" dirty="0">
-                <a:hlinkClick r:id="rId3"/>
-              </a:rPr>
-              <a:t>https://wiki.ubuntu.com/WSL</a:t>
-            </a:r>
-            <a:endParaRPr lang="en-US" dirty="0" smtClean="0"/>
-          </a:p>
-          <a:p>
-            <a:r>
-              <a:rPr lang="en-IN" dirty="0" smtClean="0">
-                <a:hlinkClick r:id="rId4"/>
-              </a:rPr>
-              <a:t>https://github.com/DDoSolitary/LxRunOffline</a:t>
-            </a:r>
-            <a:endParaRPr lang="en-IN" dirty="0" smtClean="0"/>
-          </a:p>
-          <a:p>
-            <a:r>
-              <a:rPr lang="en-IN" dirty="0">
-                <a:hlinkClick r:id="rId5"/>
-              </a:rPr>
-              <a:t>https://marketplace.visualstudio.com/items?itemName=VisualCppDevLabs.VisualCforLinuxDevelopment</a:t>
-            </a:r>
+            <a:pPr marL="0" indent="0">
+              <a:buNone/>
+            </a:pPr>
             <a:endParaRPr lang="en-IN" dirty="0"/>
           </a:p>
         </p:txBody>
@@ -9060,7 +9212,7 @@
     </p:spTree>
     <p:extLst>
       <p:ext uri="{BB962C8B-B14F-4D97-AF65-F5344CB8AC3E}">
-        <p14:creationId xmlns:p14="http://schemas.microsoft.com/office/powerpoint/2010/main" val="1141222975"/>
+        <p14:creationId xmlns:p14="http://schemas.microsoft.com/office/powerpoint/2010/main" val="4020723764"/>
       </p:ext>
     </p:extLst>
   </p:cSld>
@@ -9104,20 +9256,569 @@
             <p:ph type="title"/>
           </p:nvPr>
         </p:nvSpPr>
-        <p:spPr>
-          <a:xfrm>
-            <a:off x="647132" y="2876313"/>
-            <a:ext cx="10515600" cy="1325563"/>
-          </a:xfrm>
-        </p:spPr>
+        <p:spPr/>
         <p:txBody>
           <a:bodyPr/>
           <a:lstStyle/>
           <a:p>
-            <a:pPr algn="ctr"/>
+            <a:r>
+              <a:rPr lang="en-IN" b="1" dirty="0" smtClean="0"/>
+              <a:t>Create HelloWorld Sample App</a:t>
+            </a:r>
+            <a:endParaRPr lang="en-IN" dirty="0"/>
+          </a:p>
+        </p:txBody>
+      </p:sp>
+      <p:sp>
+        <p:nvSpPr>
+          <p:cNvPr id="3" name="Content Placeholder 2"/>
+          <p:cNvSpPr>
+            <a:spLocks noGrp="1"/>
+          </p:cNvSpPr>
+          <p:nvPr>
+            <p:ph idx="1"/>
+          </p:nvPr>
+        </p:nvSpPr>
+        <p:spPr/>
+        <p:txBody>
+          <a:bodyPr>
+            <a:noAutofit/>
+          </a:bodyPr>
+          <a:lstStyle/>
+          <a:p>
+            <a:pPr marL="0" indent="0">
+              <a:buNone/>
+            </a:pPr>
+            <a:r>
+              <a:rPr lang="en-IN" sz="1100" dirty="0"/>
+              <a:t>1. </a:t>
+            </a:r>
+            <a:r>
+              <a:rPr lang="en-IN" sz="1100" dirty="0" smtClean="0"/>
+              <a:t>Create HelloWorld Console App Project</a:t>
+            </a:r>
+            <a:endParaRPr lang="en-IN" sz="1100" dirty="0"/>
+          </a:p>
+          <a:p>
+            <a:pPr marL="0" indent="0">
+              <a:buNone/>
+            </a:pPr>
+            <a:r>
+              <a:rPr lang="en-IN" sz="1100" dirty="0"/>
+              <a:t>$ dotnet new console -o </a:t>
+            </a:r>
+            <a:r>
+              <a:rPr lang="en-IN" sz="1100" dirty="0" smtClean="0"/>
+              <a:t>HelloWorld</a:t>
+            </a:r>
+          </a:p>
+          <a:p>
+            <a:pPr marL="0" indent="0">
+              <a:buNone/>
+            </a:pPr>
+            <a:r>
+              <a:rPr lang="en-US" sz="1100" dirty="0" smtClean="0"/>
+              <a:t>2. Change to newly created folder HelloWorld and edit Program.cs</a:t>
+            </a:r>
+          </a:p>
+          <a:p>
+            <a:pPr marL="0" indent="0">
+              <a:buNone/>
+            </a:pPr>
+            <a:r>
+              <a:rPr lang="en-IN" sz="1100" dirty="0"/>
+              <a:t>$ </a:t>
+            </a:r>
+            <a:r>
+              <a:rPr lang="en-IN" sz="1100" dirty="0" smtClean="0"/>
+              <a:t>cd </a:t>
+            </a:r>
+            <a:r>
+              <a:rPr lang="en-US" sz="1100" dirty="0"/>
+              <a:t>HelloWorld </a:t>
+            </a:r>
+            <a:endParaRPr lang="en-IN" sz="1100" dirty="0" smtClean="0"/>
+          </a:p>
+          <a:p>
+            <a:pPr marL="0" indent="0">
+              <a:buNone/>
+            </a:pPr>
+            <a:r>
+              <a:rPr lang="en-IN" sz="1100" dirty="0"/>
+              <a:t>$ </a:t>
+            </a:r>
+            <a:r>
+              <a:rPr lang="en-IN" sz="1100" dirty="0" smtClean="0"/>
+              <a:t>nano </a:t>
+            </a:r>
+            <a:r>
+              <a:rPr lang="en-US" sz="1100" dirty="0" smtClean="0"/>
+              <a:t>Program.cs</a:t>
+            </a:r>
+          </a:p>
+          <a:p>
+            <a:pPr marL="0" indent="0">
+              <a:lnSpc>
+                <a:spcPct val="120000"/>
+              </a:lnSpc>
+              <a:spcBef>
+                <a:spcPts val="0"/>
+              </a:spcBef>
+              <a:buNone/>
+            </a:pPr>
+            <a:r>
+              <a:rPr lang="en-IN" sz="1100" dirty="0"/>
+              <a:t>using system</a:t>
+            </a:r>
+            <a:r>
+              <a:rPr lang="en-IN" sz="1100" dirty="0" smtClean="0"/>
+              <a:t>;</a:t>
+            </a:r>
+            <a:endParaRPr lang="en-IN" sz="1100" dirty="0"/>
+          </a:p>
+          <a:p>
+            <a:pPr marL="0" indent="0">
+              <a:lnSpc>
+                <a:spcPct val="120000"/>
+              </a:lnSpc>
+              <a:spcBef>
+                <a:spcPts val="0"/>
+              </a:spcBef>
+              <a:buNone/>
+            </a:pPr>
+            <a:r>
+              <a:rPr lang="en-IN" sz="1100" dirty="0"/>
+              <a:t>namespace HelloWorld</a:t>
+            </a:r>
+          </a:p>
+          <a:p>
+            <a:pPr marL="0" indent="0">
+              <a:lnSpc>
+                <a:spcPct val="120000"/>
+              </a:lnSpc>
+              <a:spcBef>
+                <a:spcPts val="0"/>
+              </a:spcBef>
+              <a:buNone/>
+            </a:pPr>
+            <a:r>
+              <a:rPr lang="en-IN" sz="1100" dirty="0" smtClean="0"/>
+              <a:t>{</a:t>
+            </a:r>
+          </a:p>
+          <a:p>
+            <a:pPr marL="0" indent="0">
+              <a:lnSpc>
+                <a:spcPct val="120000"/>
+              </a:lnSpc>
+              <a:spcBef>
+                <a:spcPts val="0"/>
+              </a:spcBef>
+              <a:buNone/>
+            </a:pPr>
+            <a:r>
+              <a:rPr lang="en-IN" sz="1100" dirty="0"/>
+              <a:t> </a:t>
+            </a:r>
+            <a:r>
+              <a:rPr lang="en-IN" sz="1100" dirty="0" smtClean="0"/>
+              <a:t>      class Program</a:t>
+            </a:r>
+          </a:p>
+          <a:p>
+            <a:pPr marL="0" indent="0">
+              <a:lnSpc>
+                <a:spcPct val="120000"/>
+              </a:lnSpc>
+              <a:spcBef>
+                <a:spcPts val="0"/>
+              </a:spcBef>
+              <a:buNone/>
+            </a:pPr>
+            <a:r>
+              <a:rPr lang="en-IN" sz="1100" dirty="0" smtClean="0"/>
+              <a:t>      {</a:t>
+            </a:r>
+          </a:p>
+          <a:p>
+            <a:pPr marL="0" indent="0">
+              <a:lnSpc>
+                <a:spcPct val="120000"/>
+              </a:lnSpc>
+              <a:spcBef>
+                <a:spcPts val="0"/>
+              </a:spcBef>
+              <a:buNone/>
+            </a:pPr>
+            <a:r>
+              <a:rPr lang="en-IN" sz="1100" dirty="0" smtClean="0"/>
+              <a:t>               static void Main(string[] args)</a:t>
+            </a:r>
+          </a:p>
+          <a:p>
+            <a:pPr marL="0" indent="0">
+              <a:lnSpc>
+                <a:spcPct val="120000"/>
+              </a:lnSpc>
+              <a:spcBef>
+                <a:spcPts val="0"/>
+              </a:spcBef>
+              <a:buNone/>
+            </a:pPr>
+            <a:r>
+              <a:rPr lang="en-IN" sz="1100" dirty="0" smtClean="0"/>
+              <a:t>               {</a:t>
+            </a:r>
+            <a:endParaRPr lang="en-IN" sz="1100" dirty="0"/>
+          </a:p>
+          <a:p>
+            <a:pPr marL="0" indent="0">
+              <a:lnSpc>
+                <a:spcPct val="120000"/>
+              </a:lnSpc>
+              <a:spcBef>
+                <a:spcPts val="0"/>
+              </a:spcBef>
+              <a:buNone/>
+            </a:pPr>
+            <a:r>
+              <a:rPr lang="en-IN" sz="1100" dirty="0"/>
+              <a:t> </a:t>
+            </a:r>
+            <a:r>
+              <a:rPr lang="en-IN" sz="1100" dirty="0" smtClean="0"/>
+              <a:t>                     Console.WriteLine</a:t>
+            </a:r>
+            <a:r>
+              <a:rPr lang="en-IN" sz="1100" dirty="0"/>
+              <a:t>("Hello World!");</a:t>
+            </a:r>
+          </a:p>
+          <a:p>
+            <a:pPr marL="0" indent="0">
+              <a:lnSpc>
+                <a:spcPct val="120000"/>
+              </a:lnSpc>
+              <a:spcBef>
+                <a:spcPts val="0"/>
+              </a:spcBef>
+              <a:buNone/>
+            </a:pPr>
+            <a:r>
+              <a:rPr lang="en-IN" sz="1100" dirty="0" smtClean="0"/>
+              <a:t>               }</a:t>
+            </a:r>
+            <a:endParaRPr lang="en-IN" sz="1100" dirty="0"/>
+          </a:p>
+          <a:p>
+            <a:pPr marL="0" indent="0">
+              <a:lnSpc>
+                <a:spcPct val="120000"/>
+              </a:lnSpc>
+              <a:spcBef>
+                <a:spcPts val="0"/>
+              </a:spcBef>
+              <a:buNone/>
+            </a:pPr>
+            <a:r>
+              <a:rPr lang="en-IN" sz="1100" dirty="0" smtClean="0"/>
+              <a:t>      }</a:t>
+            </a:r>
+            <a:endParaRPr lang="en-IN" sz="1100" dirty="0"/>
+          </a:p>
+          <a:p>
+            <a:pPr marL="0" indent="0">
+              <a:lnSpc>
+                <a:spcPct val="120000"/>
+              </a:lnSpc>
+              <a:spcBef>
+                <a:spcPts val="0"/>
+              </a:spcBef>
+              <a:buNone/>
+            </a:pPr>
+            <a:r>
+              <a:rPr lang="en-IN" sz="1100" dirty="0" smtClean="0"/>
+              <a:t>}</a:t>
+            </a:r>
+          </a:p>
+          <a:p>
+            <a:pPr marL="0" indent="0">
+              <a:lnSpc>
+                <a:spcPct val="120000"/>
+              </a:lnSpc>
+              <a:spcBef>
+                <a:spcPts val="0"/>
+              </a:spcBef>
+              <a:buNone/>
+            </a:pPr>
+            <a:r>
+              <a:rPr lang="en-IN" sz="1100" dirty="0"/>
+              <a:t>Write (^O ) then exit (^X</a:t>
+            </a:r>
+            <a:r>
+              <a:rPr lang="en-IN" sz="1100" dirty="0" smtClean="0"/>
+              <a:t>).</a:t>
+            </a:r>
+            <a:endParaRPr lang="en-US" sz="1100" dirty="0"/>
+          </a:p>
+          <a:p>
+            <a:pPr marL="0" indent="0">
+              <a:buNone/>
+            </a:pPr>
+            <a:r>
+              <a:rPr lang="en-US" sz="1100" dirty="0" smtClean="0"/>
+              <a:t>3. </a:t>
+            </a:r>
+            <a:r>
+              <a:rPr lang="en-IN" sz="1100" dirty="0" smtClean="0"/>
+              <a:t>Run HelloWorld App</a:t>
+            </a:r>
+            <a:endParaRPr lang="en-IN" sz="1100" dirty="0"/>
+          </a:p>
+          <a:p>
+            <a:pPr marL="0" indent="0">
+              <a:buNone/>
+            </a:pPr>
+            <a:r>
+              <a:rPr lang="en-IN" sz="1100" dirty="0"/>
+              <a:t>$ </a:t>
+            </a:r>
+            <a:r>
+              <a:rPr lang="en-IN" sz="1100" dirty="0" smtClean="0"/>
+              <a:t>dotnet run</a:t>
+            </a:r>
+            <a:endParaRPr lang="en-IN" sz="1100" dirty="0"/>
+          </a:p>
+        </p:txBody>
+      </p:sp>
+    </p:spTree>
+    <p:extLst>
+      <p:ext uri="{BB962C8B-B14F-4D97-AF65-F5344CB8AC3E}">
+        <p14:creationId xmlns:p14="http://schemas.microsoft.com/office/powerpoint/2010/main" val="2423861812"/>
+      </p:ext>
+    </p:extLst>
+  </p:cSld>
+  <p:clrMapOvr>
+    <a:masterClrMapping/>
+  </p:clrMapOvr>
+  <p:timing>
+    <p:tnLst>
+      <p:par>
+        <p:cTn id="1" dur="indefinite" restart="never" nodeType="tmRoot"/>
+      </p:par>
+    </p:tnLst>
+  </p:timing>
+</p:sld>
+</file>
+
+<file path=ppt/slides/slide27.xml><?xml version="1.0" encoding="utf-8"?>
+<p:sld xmlns:a="http://schemas.openxmlformats.org/drawingml/2006/main" xmlns:r="http://schemas.openxmlformats.org/officeDocument/2006/relationships" xmlns:p="http://schemas.openxmlformats.org/presentationml/2006/main">
+  <p:cSld>
+    <p:spTree>
+      <p:nvGrpSpPr>
+        <p:cNvPr id="1" name=""/>
+        <p:cNvGrpSpPr/>
+        <p:nvPr/>
+      </p:nvGrpSpPr>
+      <p:grpSpPr>
+        <a:xfrm>
+          <a:off x="0" y="0"/>
+          <a:ext cx="0" cy="0"/>
+          <a:chOff x="0" y="0"/>
+          <a:chExt cx="0" cy="0"/>
+        </a:xfrm>
+      </p:grpSpPr>
+      <p:sp>
+        <p:nvSpPr>
+          <p:cNvPr id="2" name="Title 1"/>
+          <p:cNvSpPr>
+            <a:spLocks noGrp="1"/>
+          </p:cNvSpPr>
+          <p:nvPr>
+            <p:ph type="title"/>
+          </p:nvPr>
+        </p:nvSpPr>
+        <p:spPr/>
+        <p:txBody>
+          <a:bodyPr/>
+          <a:lstStyle/>
+          <a:p>
             <a:r>
               <a:rPr lang="en-US" dirty="0" smtClean="0"/>
-              <a:t>Thank You</a:t>
+              <a:t>References</a:t>
+            </a:r>
+            <a:endParaRPr lang="en-IN" dirty="0"/>
+          </a:p>
+        </p:txBody>
+      </p:sp>
+      <p:sp>
+        <p:nvSpPr>
+          <p:cNvPr id="3" name="Content Placeholder 2"/>
+          <p:cNvSpPr>
+            <a:spLocks noGrp="1"/>
+          </p:cNvSpPr>
+          <p:nvPr>
+            <p:ph idx="1"/>
+          </p:nvPr>
+        </p:nvSpPr>
+        <p:spPr/>
+        <p:txBody>
+          <a:bodyPr/>
+          <a:lstStyle/>
+          <a:p>
+            <a:r>
+              <a:rPr lang="en-IN" dirty="0">
+                <a:hlinkClick r:id="rId2"/>
+              </a:rPr>
+              <a:t>https://docs.microsoft.com/en-us/archive/blogs/wsl/</a:t>
+            </a:r>
+          </a:p>
+          <a:p>
+            <a:r>
+              <a:rPr lang="en-IN" dirty="0" smtClean="0">
+                <a:hlinkClick r:id="rId2"/>
+              </a:rPr>
+              <a:t>https</a:t>
+            </a:r>
+            <a:r>
+              <a:rPr lang="en-IN" dirty="0">
+                <a:hlinkClick r:id="rId2"/>
+              </a:rPr>
+              <a:t>://</a:t>
+            </a:r>
+            <a:r>
+              <a:rPr lang="en-IN" dirty="0" smtClean="0">
+                <a:hlinkClick r:id="rId2"/>
+              </a:rPr>
+              <a:t>docs.microsoft.com/en-us/windows/wsl/about</a:t>
+            </a:r>
+            <a:endParaRPr lang="en-IN" dirty="0" smtClean="0"/>
+          </a:p>
+          <a:p>
+            <a:r>
+              <a:rPr lang="en-IN" dirty="0">
+                <a:hlinkClick r:id="rId3"/>
+              </a:rPr>
+              <a:t>https://wiki.ubuntu.com/WSL</a:t>
+            </a:r>
+            <a:endParaRPr lang="en-US" dirty="0" smtClean="0"/>
+          </a:p>
+          <a:p>
+            <a:r>
+              <a:rPr lang="en-IN" dirty="0" smtClean="0">
+                <a:hlinkClick r:id="rId4"/>
+              </a:rPr>
+              <a:t>https://github.com/DDoSolitary/LxRunOffline</a:t>
+            </a:r>
+            <a:endParaRPr lang="en-IN" dirty="0" smtClean="0"/>
+          </a:p>
+          <a:p>
+            <a:r>
+              <a:rPr lang="en-IN" dirty="0">
+                <a:hlinkClick r:id="rId5"/>
+              </a:rPr>
+              <a:t>https://</a:t>
+            </a:r>
+            <a:r>
+              <a:rPr lang="en-IN" dirty="0" smtClean="0">
+                <a:hlinkClick r:id="rId5"/>
+              </a:rPr>
+              <a:t>marketplace.visualstudio.com/items?itemName=VisualCppDevLabs.VisualCforLinuxDevelopment</a:t>
+            </a:r>
+            <a:endParaRPr lang="en-IN" dirty="0" smtClean="0"/>
+          </a:p>
+          <a:p>
+            <a:r>
+              <a:rPr lang="en-IN" dirty="0">
+                <a:hlinkClick r:id="rId6"/>
+              </a:rPr>
+              <a:t>https://docs.microsoft.com/en-us/dotnet/core/install/</a:t>
+            </a:r>
+            <a:endParaRPr lang="en-IN" dirty="0"/>
+          </a:p>
+        </p:txBody>
+      </p:sp>
+    </p:spTree>
+    <p:extLst>
+      <p:ext uri="{BB962C8B-B14F-4D97-AF65-F5344CB8AC3E}">
+        <p14:creationId xmlns:p14="http://schemas.microsoft.com/office/powerpoint/2010/main" val="1141222975"/>
+      </p:ext>
+    </p:extLst>
+  </p:cSld>
+  <p:clrMapOvr>
+    <a:masterClrMapping/>
+  </p:clrMapOvr>
+  <p:timing>
+    <p:tnLst>
+      <p:par>
+        <p:cTn id="1" dur="indefinite" restart="never" nodeType="tmRoot"/>
+      </p:par>
+    </p:tnLst>
+  </p:timing>
+</p:sld>
+</file>
+
+<file path=ppt/slides/slide28.xml><?xml version="1.0" encoding="utf-8"?>
+<p:sld xmlns:a="http://schemas.openxmlformats.org/drawingml/2006/main" xmlns:r="http://schemas.openxmlformats.org/officeDocument/2006/relationships" xmlns:p="http://schemas.openxmlformats.org/presentationml/2006/main">
+  <p:cSld>
+    <p:spTree>
+      <p:nvGrpSpPr>
+        <p:cNvPr id="1" name=""/>
+        <p:cNvGrpSpPr/>
+        <p:nvPr/>
+      </p:nvGrpSpPr>
+      <p:grpSpPr>
+        <a:xfrm>
+          <a:off x="0" y="0"/>
+          <a:ext cx="0" cy="0"/>
+          <a:chOff x="0" y="0"/>
+          <a:chExt cx="0" cy="0"/>
+        </a:xfrm>
+      </p:grpSpPr>
+      <p:sp>
+        <p:nvSpPr>
+          <p:cNvPr id="4" name="Title 1"/>
+          <p:cNvSpPr>
+            <a:spLocks noGrp="1"/>
+          </p:cNvSpPr>
+          <p:nvPr/>
+        </p:nvSpPr>
+        <p:spPr>
+          <a:xfrm>
+            <a:off x="1356983" y="5018099"/>
+            <a:ext cx="4401065" cy="1325563"/>
+          </a:xfrm>
+          <a:prstGeom prst="rect">
+            <a:avLst/>
+          </a:prstGeom>
+        </p:spPr>
+        <p:txBody>
+          <a:bodyPr vert="horz" lIns="91440" tIns="45720" rIns="91440" bIns="45720" rtlCol="0" anchor="ctr">
+            <a:normAutofit/>
+          </a:bodyPr>
+          <a:lstStyle>
+            <a:lvl1pPr algn="l" defTabSz="914400" rtl="0" eaLnBrk="1" latinLnBrk="0" hangingPunct="1">
+              <a:lnSpc>
+                <a:spcPct val="90000"/>
+              </a:lnSpc>
+              <a:spcBef>
+                <a:spcPct val="0"/>
+              </a:spcBef>
+              <a:buNone/>
+              <a:defRPr sz="4400" kern="1200">
+                <a:solidFill>
+                  <a:schemeClr val="tx1"/>
+                </a:solidFill>
+                <a:latin typeface="+mj-lt"/>
+                <a:ea typeface="+mj-ea"/>
+                <a:cs typeface="+mj-cs"/>
+              </a:defRPr>
+            </a:lvl1pPr>
+          </a:lstStyle>
+          <a:p>
+            <a:r>
+              <a:rPr lang="en-US" dirty="0" smtClean="0"/>
+              <a:t>END OF FILE</a:t>
             </a:r>
             <a:endParaRPr lang="en-IN" dirty="0"/>
           </a:p>
@@ -10524,15 +11225,19 @@
             </a:pPr>
             <a:r>
               <a:rPr lang="en-IN" dirty="0" smtClean="0"/>
-              <a:t>&gt;DISM </a:t>
+              <a:t>&gt;Dism </a:t>
             </a:r>
             <a:r>
               <a:rPr lang="en-IN" dirty="0"/>
-              <a:t>/online /disable-feature /</a:t>
+              <a:t>/online </a:t>
             </a:r>
             <a:r>
               <a:rPr lang="en-IN" dirty="0" smtClean="0"/>
-              <a:t>featurename:Microsoft-Windows-Subsystem-Linux</a:t>
+              <a:t>/Enable-Feature </a:t>
+            </a:r>
+            <a:r>
+              <a:rPr lang="en-IN" dirty="0" smtClean="0"/>
+              <a:t>/All /FeatureName:Microsoft-Windows-Subsystem-Linux</a:t>
             </a:r>
             <a:endParaRPr lang="en-US" dirty="0"/>
           </a:p>

</xml_diff>